<commit_message>
Worked the powerpoint a little bit
</commit_message>
<xml_diff>
--- a/Programming in unity.pptx
+++ b/Programming in unity.pptx
@@ -7,10 +7,11 @@
   <p:sldIdLst>
     <p:sldId id="256" r:id="rId2"/>
     <p:sldId id="257" r:id="rId3"/>
-    <p:sldId id="261" r:id="rId4"/>
-    <p:sldId id="260" r:id="rId5"/>
+    <p:sldId id="260" r:id="rId4"/>
+    <p:sldId id="261" r:id="rId5"/>
     <p:sldId id="259" r:id="rId6"/>
-    <p:sldId id="258" r:id="rId7"/>
+    <p:sldId id="262" r:id="rId7"/>
+    <p:sldId id="258" r:id="rId8"/>
   </p:sldIdLst>
   <p:sldSz cx="12192000" cy="6858000"/>
   <p:notesSz cx="6858000" cy="9144000"/>
@@ -109,6 +110,11 @@
       </a:defRPr>
     </a:lvl9pPr>
   </p:defaultTextStyle>
+  <p:extLst>
+    <p:ext uri="{EFAFB233-063F-42B5-8137-9DF3F51BA10A}">
+      <p15:sldGuideLst xmlns:p15="http://schemas.microsoft.com/office/powerpoint/2012/main"/>
+    </p:ext>
+  </p:extLst>
 </p:presentation>
 </file>
 
@@ -5970,11 +5976,10 @@
             </a:r>
           </a:p>
           <a:p>
-            <a:pPr marL="285750" indent="-285750">
-              <a:buFont typeface="Arial" panose="020B0604020202020204" pitchFamily="34" charset="0"/>
-              <a:buChar char="•"/>
-            </a:pPr>
-            <a:endParaRPr lang="en-US" sz="2800" dirty="0"/>
+            <a:r>
+              <a:rPr lang="en-US" sz="2800" dirty="0"/>
+              <a:t> </a:t>
+            </a:r>
           </a:p>
           <a:p>
             <a:pPr algn="ctr"/>
@@ -6347,86 +6352,6 @@
           <p:cNvPr id="2" name="Title 1">
             <a:extLst>
               <a:ext uri="{FF2B5EF4-FFF2-40B4-BE49-F238E27FC236}">
-                <a16:creationId xmlns:a16="http://schemas.microsoft.com/office/drawing/2014/main" id="{784BBC20-B557-4726-A5F2-48202AAC5D15}"/>
-              </a:ext>
-            </a:extLst>
-          </p:cNvPr>
-          <p:cNvSpPr>
-            <a:spLocks noGrp="1"/>
-          </p:cNvSpPr>
-          <p:nvPr>
-            <p:ph type="title"/>
-          </p:nvPr>
-        </p:nvSpPr>
-        <p:spPr/>
-        <p:txBody>
-          <a:bodyPr/>
-          <a:lstStyle/>
-          <a:p>
-            <a:endParaRPr lang="en-US"/>
-          </a:p>
-        </p:txBody>
-      </p:sp>
-      <p:sp>
-        <p:nvSpPr>
-          <p:cNvPr id="3" name="Content Placeholder 2">
-            <a:extLst>
-              <a:ext uri="{FF2B5EF4-FFF2-40B4-BE49-F238E27FC236}">
-                <a16:creationId xmlns:a16="http://schemas.microsoft.com/office/drawing/2014/main" id="{0E83056F-6429-4A9A-A994-D246B3DB47F9}"/>
-              </a:ext>
-            </a:extLst>
-          </p:cNvPr>
-          <p:cNvSpPr>
-            <a:spLocks noGrp="1"/>
-          </p:cNvSpPr>
-          <p:nvPr>
-            <p:ph idx="1"/>
-          </p:nvPr>
-        </p:nvSpPr>
-        <p:spPr/>
-        <p:txBody>
-          <a:bodyPr/>
-          <a:lstStyle/>
-          <a:p>
-            <a:endParaRPr lang="en-US"/>
-          </a:p>
-        </p:txBody>
-      </p:sp>
-    </p:spTree>
-    <p:extLst>
-      <p:ext uri="{BB962C8B-B14F-4D97-AF65-F5344CB8AC3E}">
-        <p14:creationId xmlns:p14="http://schemas.microsoft.com/office/powerpoint/2010/main" val="3324078343"/>
-      </p:ext>
-    </p:extLst>
-  </p:cSld>
-  <p:clrMapOvr>
-    <a:masterClrMapping/>
-  </p:clrMapOvr>
-</p:sld>
-</file>
-
-<file path=ppt/slides/slide4.xml><?xml version="1.0" encoding="utf-8"?>
-<p:sld xmlns:a="http://schemas.openxmlformats.org/drawingml/2006/main" xmlns:r="http://schemas.openxmlformats.org/officeDocument/2006/relationships" xmlns:p="http://schemas.openxmlformats.org/presentationml/2006/main">
-  <p:cSld>
-    <p:spTree>
-      <p:nvGrpSpPr>
-        <p:cNvPr id="1" name=""/>
-        <p:cNvGrpSpPr/>
-        <p:nvPr/>
-      </p:nvGrpSpPr>
-      <p:grpSpPr>
-        <a:xfrm>
-          <a:off x="0" y="0"/>
-          <a:ext cx="0" cy="0"/>
-          <a:chOff x="0" y="0"/>
-          <a:chExt cx="0" cy="0"/>
-        </a:xfrm>
-      </p:grpSpPr>
-      <p:sp>
-        <p:nvSpPr>
-          <p:cNvPr id="2" name="Title 1">
-            <a:extLst>
-              <a:ext uri="{FF2B5EF4-FFF2-40B4-BE49-F238E27FC236}">
                 <a16:creationId xmlns:a16="http://schemas.microsoft.com/office/drawing/2014/main" id="{FF81725A-0E6A-4948-A3DF-76A71D5AC2F8}"/>
               </a:ext>
             </a:extLst>
@@ -6540,13 +6465,16 @@
               </a:ext>
             </a:extLst>
           </p:cNvPr>
-          <p:cNvCxnSpPr/>
+          <p:cNvCxnSpPr>
+            <a:cxnSpLocks/>
+            <a:stCxn id="8" idx="3"/>
+          </p:cNvCxnSpPr>
           <p:nvPr/>
         </p:nvCxnSpPr>
         <p:spPr>
           <a:xfrm flipV="1">
-            <a:off x="3137483" y="2919369"/>
-            <a:ext cx="1887523" cy="302003"/>
+            <a:off x="3008071" y="2870245"/>
+            <a:ext cx="2025402" cy="208325"/>
           </a:xfrm>
           <a:prstGeom prst="straightConnector1">
             <a:avLst/>
@@ -6584,8 +6512,8 @@
         </p:nvSpPr>
         <p:spPr>
           <a:xfrm>
-            <a:off x="456502" y="3041655"/>
-            <a:ext cx="2680981" cy="369332"/>
+            <a:off x="327090" y="2616905"/>
+            <a:ext cx="2680981" cy="923330"/>
           </a:xfrm>
           <a:prstGeom prst="rect">
             <a:avLst/>
@@ -6600,7 +6528,13 @@
           <a:p>
             <a:r>
               <a:rPr lang="en-US" dirty="0"/>
-              <a:t>This is an access modifier.</a:t>
+              <a:t>This is an access modifier.  </a:t>
+            </a:r>
+          </a:p>
+          <a:p>
+            <a:r>
+              <a:rPr lang="en-US" dirty="0"/>
+              <a:t>Modifiers include private, protected, and public</a:t>
             </a:r>
           </a:p>
         </p:txBody>
@@ -6658,7 +6592,7 @@
         </p:nvSpPr>
         <p:spPr>
           <a:xfrm>
-            <a:off x="369116" y="3523742"/>
+            <a:off x="1036929" y="3616626"/>
             <a:ext cx="3338818" cy="646331"/>
           </a:xfrm>
           <a:prstGeom prst="rect">
@@ -7018,6 +6952,125 @@
 </p:sld>
 </file>
 
+<file path=ppt/slides/slide4.xml><?xml version="1.0" encoding="utf-8"?>
+<p:sld xmlns:a="http://schemas.openxmlformats.org/drawingml/2006/main" xmlns:r="http://schemas.openxmlformats.org/officeDocument/2006/relationships" xmlns:p="http://schemas.openxmlformats.org/presentationml/2006/main">
+  <p:cSld>
+    <p:spTree>
+      <p:nvGrpSpPr>
+        <p:cNvPr id="1" name=""/>
+        <p:cNvGrpSpPr/>
+        <p:nvPr/>
+      </p:nvGrpSpPr>
+      <p:grpSpPr>
+        <a:xfrm>
+          <a:off x="0" y="0"/>
+          <a:ext cx="0" cy="0"/>
+          <a:chOff x="0" y="0"/>
+          <a:chExt cx="0" cy="0"/>
+        </a:xfrm>
+      </p:grpSpPr>
+      <p:sp>
+        <p:nvSpPr>
+          <p:cNvPr id="2" name="Title 1">
+            <a:extLst>
+              <a:ext uri="{FF2B5EF4-FFF2-40B4-BE49-F238E27FC236}">
+                <a16:creationId xmlns:a16="http://schemas.microsoft.com/office/drawing/2014/main" id="{86BBBC64-66F3-4BD8-9AB9-86EAF98BCA7F}"/>
+              </a:ext>
+            </a:extLst>
+          </p:cNvPr>
+          <p:cNvSpPr>
+            <a:spLocks noGrp="1"/>
+          </p:cNvSpPr>
+          <p:nvPr>
+            <p:ph type="title"/>
+          </p:nvPr>
+        </p:nvSpPr>
+        <p:spPr/>
+        <p:txBody>
+          <a:bodyPr/>
+          <a:lstStyle/>
+          <a:p>
+            <a:pPr algn="ctr"/>
+            <a:r>
+              <a:rPr lang="en-US" dirty="0"/>
+              <a:t>Unity functions</a:t>
+            </a:r>
+          </a:p>
+        </p:txBody>
+      </p:sp>
+      <p:sp>
+        <p:nvSpPr>
+          <p:cNvPr id="4" name="TextBox 3">
+            <a:extLst>
+              <a:ext uri="{FF2B5EF4-FFF2-40B4-BE49-F238E27FC236}">
+                <a16:creationId xmlns:a16="http://schemas.microsoft.com/office/drawing/2014/main" id="{54878029-CE72-4156-B775-C4035493113C}"/>
+              </a:ext>
+            </a:extLst>
+          </p:cNvPr>
+          <p:cNvSpPr txBox="1"/>
+          <p:nvPr/>
+        </p:nvSpPr>
+        <p:spPr>
+          <a:xfrm>
+            <a:off x="1534160" y="1862667"/>
+            <a:ext cx="9184640" cy="1477328"/>
+          </a:xfrm>
+          <a:prstGeom prst="rect">
+            <a:avLst/>
+          </a:prstGeom>
+          <a:noFill/>
+        </p:spPr>
+        <p:txBody>
+          <a:bodyPr wrap="square" rtlCol="0">
+            <a:spAutoFit/>
+          </a:bodyPr>
+          <a:lstStyle/>
+          <a:p>
+            <a:r>
+              <a:rPr lang="en-US" dirty="0"/>
+              <a:t>Awake() - </a:t>
+            </a:r>
+          </a:p>
+          <a:p>
+            <a:r>
+              <a:rPr lang="en-US" dirty="0"/>
+              <a:t>Start() -</a:t>
+            </a:r>
+          </a:p>
+          <a:p>
+            <a:r>
+              <a:rPr lang="en-US" dirty="0"/>
+              <a:t>Update() -</a:t>
+            </a:r>
+          </a:p>
+          <a:p>
+            <a:r>
+              <a:rPr lang="en-US" dirty="0" err="1"/>
+              <a:t>FixedUpdate</a:t>
+            </a:r>
+            <a:r>
+              <a:rPr lang="en-US" dirty="0"/>
+              <a:t>() -</a:t>
+            </a:r>
+          </a:p>
+          <a:p>
+            <a:endParaRPr lang="en-US" dirty="0"/>
+          </a:p>
+        </p:txBody>
+      </p:sp>
+    </p:spTree>
+    <p:extLst>
+      <p:ext uri="{BB962C8B-B14F-4D97-AF65-F5344CB8AC3E}">
+        <p14:creationId xmlns:p14="http://schemas.microsoft.com/office/powerpoint/2010/main" val="792382933"/>
+      </p:ext>
+    </p:extLst>
+  </p:cSld>
+  <p:clrMapOvr>
+    <a:masterClrMapping/>
+  </p:clrMapOvr>
+</p:sld>
+</file>
+
 <file path=ppt/slides/slide5.xml><?xml version="1.0" encoding="utf-8"?>
 <p:sld xmlns:a="http://schemas.openxmlformats.org/drawingml/2006/main" xmlns:r="http://schemas.openxmlformats.org/officeDocument/2006/relationships" xmlns:p="http://schemas.openxmlformats.org/presentationml/2006/main">
   <p:cSld>
@@ -7094,7 +7147,7 @@
           <a:p>
             <a:r>
               <a:rPr lang="en-US" dirty="0"/>
-              <a:t>Incredibly important</a:t>
+              <a:t>Very important</a:t>
             </a:r>
           </a:p>
           <a:p>
@@ -7167,6 +7220,90 @@
 </file>
 
 <file path=ppt/slides/slide6.xml><?xml version="1.0" encoding="utf-8"?>
+<p:sld xmlns:a="http://schemas.openxmlformats.org/drawingml/2006/main" xmlns:r="http://schemas.openxmlformats.org/officeDocument/2006/relationships" xmlns:p="http://schemas.openxmlformats.org/presentationml/2006/main">
+  <p:cSld>
+    <p:spTree>
+      <p:nvGrpSpPr>
+        <p:cNvPr id="1" name=""/>
+        <p:cNvGrpSpPr/>
+        <p:nvPr/>
+      </p:nvGrpSpPr>
+      <p:grpSpPr>
+        <a:xfrm>
+          <a:off x="0" y="0"/>
+          <a:ext cx="0" cy="0"/>
+          <a:chOff x="0" y="0"/>
+          <a:chExt cx="0" cy="0"/>
+        </a:xfrm>
+      </p:grpSpPr>
+      <p:sp>
+        <p:nvSpPr>
+          <p:cNvPr id="2" name="Title 1">
+            <a:extLst>
+              <a:ext uri="{FF2B5EF4-FFF2-40B4-BE49-F238E27FC236}">
+                <a16:creationId xmlns:a16="http://schemas.microsoft.com/office/drawing/2014/main" id="{A241EEEE-C90F-44DF-812F-6C45FCABC75A}"/>
+              </a:ext>
+            </a:extLst>
+          </p:cNvPr>
+          <p:cNvSpPr>
+            <a:spLocks noGrp="1"/>
+          </p:cNvSpPr>
+          <p:nvPr>
+            <p:ph type="title"/>
+          </p:nvPr>
+        </p:nvSpPr>
+        <p:spPr/>
+        <p:txBody>
+          <a:bodyPr/>
+          <a:lstStyle/>
+          <a:p>
+            <a:pPr algn="ctr"/>
+            <a:r>
+              <a:rPr lang="en-US" dirty="0"/>
+              <a:t>Using functions within a class</a:t>
+            </a:r>
+          </a:p>
+        </p:txBody>
+      </p:sp>
+      <p:sp>
+        <p:nvSpPr>
+          <p:cNvPr id="3" name="Content Placeholder 2">
+            <a:extLst>
+              <a:ext uri="{FF2B5EF4-FFF2-40B4-BE49-F238E27FC236}">
+                <a16:creationId xmlns:a16="http://schemas.microsoft.com/office/drawing/2014/main" id="{0236EF9E-1080-48FA-BDD1-CCEF0EB42CDA}"/>
+              </a:ext>
+            </a:extLst>
+          </p:cNvPr>
+          <p:cNvSpPr>
+            <a:spLocks noGrp="1"/>
+          </p:cNvSpPr>
+          <p:nvPr>
+            <p:ph idx="1"/>
+          </p:nvPr>
+        </p:nvSpPr>
+        <p:spPr/>
+        <p:txBody>
+          <a:bodyPr/>
+          <a:lstStyle/>
+          <a:p>
+            <a:endParaRPr lang="en-US"/>
+          </a:p>
+        </p:txBody>
+      </p:sp>
+    </p:spTree>
+    <p:extLst>
+      <p:ext uri="{BB962C8B-B14F-4D97-AF65-F5344CB8AC3E}">
+        <p14:creationId xmlns:p14="http://schemas.microsoft.com/office/powerpoint/2010/main" val="821011519"/>
+      </p:ext>
+    </p:extLst>
+  </p:cSld>
+  <p:clrMapOvr>
+    <a:masterClrMapping/>
+  </p:clrMapOvr>
+</p:sld>
+</file>
+
+<file path=ppt/slides/slide7.xml><?xml version="1.0" encoding="utf-8"?>
 <p:sld xmlns:a="http://schemas.openxmlformats.org/drawingml/2006/main" xmlns:r="http://schemas.openxmlformats.org/officeDocument/2006/relationships" xmlns:p="http://schemas.openxmlformats.org/presentationml/2006/main">
   <p:cSld>
     <p:spTree>

</xml_diff>

<commit_message>
Finished up the powerpoint ready for lesson
</commit_message>
<xml_diff>
--- a/Programming in unity.pptx
+++ b/Programming in unity.pptx
@@ -10,8 +10,9 @@
     <p:sldId id="260" r:id="rId4"/>
     <p:sldId id="261" r:id="rId5"/>
     <p:sldId id="259" r:id="rId6"/>
-    <p:sldId id="262" r:id="rId7"/>
-    <p:sldId id="258" r:id="rId8"/>
+    <p:sldId id="263" r:id="rId7"/>
+    <p:sldId id="262" r:id="rId8"/>
+    <p:sldId id="258" r:id="rId9"/>
   </p:sldIdLst>
   <p:sldSz cx="12192000" cy="6858000"/>
   <p:notesSz cx="6858000" cy="9144000"/>
@@ -348,7 +349,7 @@
             <a:fld id="{B61BEF0D-F0BB-DE4B-95CE-6DB70DBA9567}" type="datetimeFigureOut">
               <a:rPr lang="en-US" dirty="0"/>
               <a:pPr/>
-              <a:t>9/22/2019</a:t>
+              <a:t>9/23/2019</a:t>
             </a:fld>
             <a:endParaRPr lang="en-US" dirty="0"/>
           </a:p>
@@ -679,7 +680,7 @@
             <a:fld id="{B61BEF0D-F0BB-DE4B-95CE-6DB70DBA9567}" type="datetimeFigureOut">
               <a:rPr lang="en-US" dirty="0"/>
               <a:pPr/>
-              <a:t>9/22/2019</a:t>
+              <a:t>9/23/2019</a:t>
             </a:fld>
             <a:endParaRPr lang="en-US" dirty="0"/>
           </a:p>
@@ -954,7 +955,7 @@
             <a:fld id="{B61BEF0D-F0BB-DE4B-95CE-6DB70DBA9567}" type="datetimeFigureOut">
               <a:rPr lang="en-US" dirty="0"/>
               <a:pPr/>
-              <a:t>9/22/2019</a:t>
+              <a:t>9/23/2019</a:t>
             </a:fld>
             <a:endParaRPr lang="en-US" dirty="0"/>
           </a:p>
@@ -1519,7 +1520,7 @@
             <a:fld id="{B61BEF0D-F0BB-DE4B-95CE-6DB70DBA9567}" type="datetimeFigureOut">
               <a:rPr lang="en-US" dirty="0"/>
               <a:pPr/>
-              <a:t>9/22/2019</a:t>
+              <a:t>9/23/2019</a:t>
             </a:fld>
             <a:endParaRPr lang="en-US" dirty="0"/>
           </a:p>
@@ -1794,7 +1795,7 @@
             <a:fld id="{B61BEF0D-F0BB-DE4B-95CE-6DB70DBA9567}" type="datetimeFigureOut">
               <a:rPr lang="en-US" dirty="0"/>
               <a:pPr/>
-              <a:t>9/22/2019</a:t>
+              <a:t>9/23/2019</a:t>
             </a:fld>
             <a:endParaRPr lang="en-US" dirty="0"/>
           </a:p>
@@ -2353,7 +2354,7 @@
             <a:fld id="{B61BEF0D-F0BB-DE4B-95CE-6DB70DBA9567}" type="datetimeFigureOut">
               <a:rPr lang="en-US" dirty="0"/>
               <a:pPr/>
-              <a:t>9/22/2019</a:t>
+              <a:t>9/23/2019</a:t>
             </a:fld>
             <a:endParaRPr lang="en-US" dirty="0"/>
           </a:p>
@@ -2677,7 +2678,7 @@
             <a:fld id="{B61BEF0D-F0BB-DE4B-95CE-6DB70DBA9567}" type="datetimeFigureOut">
               <a:rPr lang="en-US" dirty="0"/>
               <a:pPr/>
-              <a:t>9/22/2019</a:t>
+              <a:t>9/23/2019</a:t>
             </a:fld>
             <a:endParaRPr lang="en-US" dirty="0"/>
           </a:p>
@@ -2879,7 +2880,7 @@
             <a:fld id="{B61BEF0D-F0BB-DE4B-95CE-6DB70DBA9567}" type="datetimeFigureOut">
               <a:rPr lang="en-US" dirty="0"/>
               <a:pPr/>
-              <a:t>9/22/2019</a:t>
+              <a:t>9/23/2019</a:t>
             </a:fld>
             <a:endParaRPr lang="en-US" dirty="0"/>
           </a:p>
@@ -3086,7 +3087,7 @@
             <a:fld id="{B61BEF0D-F0BB-DE4B-95CE-6DB70DBA9567}" type="datetimeFigureOut">
               <a:rPr lang="en-US" dirty="0"/>
               <a:pPr/>
-              <a:t>9/22/2019</a:t>
+              <a:t>9/23/2019</a:t>
             </a:fld>
             <a:endParaRPr lang="en-US" dirty="0"/>
           </a:p>
@@ -3283,7 +3284,7 @@
             <a:fld id="{B61BEF0D-F0BB-DE4B-95CE-6DB70DBA9567}" type="datetimeFigureOut">
               <a:rPr lang="en-US" dirty="0"/>
               <a:pPr/>
-              <a:t>9/22/2019</a:t>
+              <a:t>9/23/2019</a:t>
             </a:fld>
             <a:endParaRPr lang="en-US" dirty="0"/>
           </a:p>
@@ -3556,7 +3557,7 @@
             <a:fld id="{B61BEF0D-F0BB-DE4B-95CE-6DB70DBA9567}" type="datetimeFigureOut">
               <a:rPr lang="en-US" dirty="0"/>
               <a:pPr/>
-              <a:t>9/22/2019</a:t>
+              <a:t>9/23/2019</a:t>
             </a:fld>
             <a:endParaRPr lang="en-US" dirty="0"/>
           </a:p>
@@ -3819,7 +3820,7 @@
             <a:fld id="{B61BEF0D-F0BB-DE4B-95CE-6DB70DBA9567}" type="datetimeFigureOut">
               <a:rPr lang="en-US" dirty="0"/>
               <a:pPr/>
-              <a:t>9/22/2019</a:t>
+              <a:t>9/23/2019</a:t>
             </a:fld>
             <a:endParaRPr lang="en-US" dirty="0"/>
           </a:p>
@@ -4190,7 +4191,7 @@
             <a:fld id="{B61BEF0D-F0BB-DE4B-95CE-6DB70DBA9567}" type="datetimeFigureOut">
               <a:rPr lang="en-US" dirty="0"/>
               <a:pPr/>
-              <a:t>9/22/2019</a:t>
+              <a:t>9/23/2019</a:t>
             </a:fld>
             <a:endParaRPr lang="en-US" dirty="0"/>
           </a:p>
@@ -4335,7 +4336,7 @@
             <a:fld id="{B61BEF0D-F0BB-DE4B-95CE-6DB70DBA9567}" type="datetimeFigureOut">
               <a:rPr lang="en-US" dirty="0"/>
               <a:pPr/>
-              <a:t>9/22/2019</a:t>
+              <a:t>9/23/2019</a:t>
             </a:fld>
             <a:endParaRPr lang="en-US" dirty="0"/>
           </a:p>
@@ -4457,7 +4458,7 @@
             <a:fld id="{B61BEF0D-F0BB-DE4B-95CE-6DB70DBA9567}" type="datetimeFigureOut">
               <a:rPr lang="en-US" dirty="0"/>
               <a:pPr/>
-              <a:t>9/22/2019</a:t>
+              <a:t>9/23/2019</a:t>
             </a:fld>
             <a:endParaRPr lang="en-US" dirty="0"/>
           </a:p>
@@ -4739,7 +4740,7 @@
             <a:fld id="{B61BEF0D-F0BB-DE4B-95CE-6DB70DBA9567}" type="datetimeFigureOut">
               <a:rPr lang="en-US" dirty="0"/>
               <a:pPr/>
-              <a:t>9/22/2019</a:t>
+              <a:t>9/23/2019</a:t>
             </a:fld>
             <a:endParaRPr lang="en-US" dirty="0"/>
           </a:p>
@@ -5060,7 +5061,7 @@
             <a:fld id="{B61BEF0D-F0BB-DE4B-95CE-6DB70DBA9567}" type="datetimeFigureOut">
               <a:rPr lang="en-US" dirty="0"/>
               <a:pPr/>
-              <a:t>9/22/2019</a:t>
+              <a:t>9/23/2019</a:t>
             </a:fld>
             <a:endParaRPr lang="en-US" dirty="0"/>
           </a:p>
@@ -5271,7 +5272,7 @@
             <a:fld id="{B61BEF0D-F0BB-DE4B-95CE-6DB70DBA9567}" type="datetimeFigureOut">
               <a:rPr lang="en-US" dirty="0"/>
               <a:pPr/>
-              <a:t>9/22/2019</a:t>
+              <a:t>9/23/2019</a:t>
             </a:fld>
             <a:endParaRPr lang="en-US" dirty="0"/>
           </a:p>
@@ -5985,7 +5986,7 @@
             <a:pPr algn="ctr"/>
             <a:r>
               <a:rPr lang="en-US" sz="2800" dirty="0"/>
-              <a:t>Declared like this:</a:t>
+              <a:t>Initialized like this:</a:t>
             </a:r>
           </a:p>
           <a:p>
@@ -6317,6 +6318,36 @@
           </a:fontRef>
         </p:style>
       </p:cxnSp>
+      <p:pic>
+        <p:nvPicPr>
+          <p:cNvPr id="5" name="Picture 4">
+            <a:extLst>
+              <a:ext uri="{FF2B5EF4-FFF2-40B4-BE49-F238E27FC236}">
+                <a16:creationId xmlns:a16="http://schemas.microsoft.com/office/drawing/2014/main" id="{057AE858-2351-49B7-B648-590505D1E78C}"/>
+              </a:ext>
+            </a:extLst>
+          </p:cNvPr>
+          <p:cNvPicPr>
+            <a:picLocks noChangeAspect="1"/>
+          </p:cNvPicPr>
+          <p:nvPr/>
+        </p:nvPicPr>
+        <p:blipFill>
+          <a:blip r:embed="rId2"/>
+          <a:stretch>
+            <a:fillRect/>
+          </a:stretch>
+        </p:blipFill>
+        <p:spPr>
+          <a:xfrm>
+            <a:off x="8923159" y="471389"/>
+            <a:ext cx="2770039" cy="938608"/>
+          </a:xfrm>
+          <a:prstGeom prst="rect">
+            <a:avLst/>
+          </a:prstGeom>
+        </p:spPr>
+      </p:pic>
     </p:spTree>
     <p:extLst>
       <p:ext uri="{BB962C8B-B14F-4D97-AF65-F5344CB8AC3E}">
@@ -6363,7 +6394,12 @@
             <p:ph type="title"/>
           </p:nvPr>
         </p:nvSpPr>
-        <p:spPr/>
+        <p:spPr>
+          <a:xfrm>
+            <a:off x="694190" y="-44086"/>
+            <a:ext cx="10131425" cy="1456267"/>
+          </a:xfrm>
+        </p:spPr>
         <p:txBody>
           <a:bodyPr/>
           <a:lstStyle/>
@@ -6390,8 +6426,8 @@
         </p:nvSpPr>
         <p:spPr>
           <a:xfrm>
-            <a:off x="994793" y="1881201"/>
-            <a:ext cx="10511406" cy="2031325"/>
+            <a:off x="840297" y="1149101"/>
+            <a:ext cx="10511406" cy="2308324"/>
           </a:xfrm>
           <a:prstGeom prst="rect">
             <a:avLst/>
@@ -6407,6 +6443,12 @@
             <a:r>
               <a:rPr lang="en-US" dirty="0"/>
               <a:t>Functions make the game go round!</a:t>
+            </a:r>
+          </a:p>
+          <a:p>
+            <a:r>
+              <a:rPr lang="en-US" dirty="0"/>
+              <a:t>We cannot make new functions inside of other functions</a:t>
             </a:r>
           </a:p>
           <a:p>
@@ -6467,13 +6509,12 @@
           </p:cNvPr>
           <p:cNvCxnSpPr>
             <a:cxnSpLocks/>
-            <a:stCxn id="8" idx="3"/>
           </p:cNvCxnSpPr>
           <p:nvPr/>
         </p:nvCxnSpPr>
         <p:spPr>
           <a:xfrm flipV="1">
-            <a:off x="3008071" y="2870245"/>
+            <a:off x="2873848" y="2540514"/>
             <a:ext cx="2025402" cy="208325"/>
           </a:xfrm>
           <a:prstGeom prst="straightConnector1">
@@ -6548,13 +6589,15 @@
               </a:ext>
             </a:extLst>
           </p:cNvPr>
-          <p:cNvCxnSpPr/>
+          <p:cNvCxnSpPr>
+            <a:cxnSpLocks/>
+          </p:cNvCxnSpPr>
           <p:nvPr/>
         </p:nvCxnSpPr>
         <p:spPr>
           <a:xfrm flipV="1">
-            <a:off x="3707934" y="3035363"/>
-            <a:ext cx="2147582" cy="546736"/>
+            <a:off x="3702342" y="2540514"/>
+            <a:ext cx="1976734" cy="1196269"/>
           </a:xfrm>
           <a:prstGeom prst="straightConnector1">
             <a:avLst/>
@@ -6622,13 +6665,15 @@
               </a:ext>
             </a:extLst>
           </p:cNvPr>
-          <p:cNvCxnSpPr/>
+          <p:cNvCxnSpPr>
+            <a:cxnSpLocks/>
+          </p:cNvCxnSpPr>
           <p:nvPr/>
         </p:nvCxnSpPr>
         <p:spPr>
           <a:xfrm flipH="1" flipV="1">
-            <a:off x="7046752" y="3078570"/>
-            <a:ext cx="1778466" cy="558059"/>
+            <a:off x="7008510" y="2604088"/>
+            <a:ext cx="1335979" cy="1132366"/>
           </a:xfrm>
           <a:prstGeom prst="straightConnector1">
             <a:avLst/>
@@ -6696,13 +6741,15 @@
               </a:ext>
             </a:extLst>
           </p:cNvPr>
-          <p:cNvCxnSpPr/>
+          <p:cNvCxnSpPr>
+            <a:cxnSpLocks/>
+          </p:cNvCxnSpPr>
           <p:nvPr/>
         </p:nvCxnSpPr>
         <p:spPr>
           <a:xfrm flipH="1" flipV="1">
-            <a:off x="7533314" y="2919369"/>
-            <a:ext cx="1820411" cy="159201"/>
+            <a:off x="7340367" y="2444721"/>
+            <a:ext cx="2013359" cy="633850"/>
           </a:xfrm>
           <a:prstGeom prst="straightConnector1">
             <a:avLst/>
@@ -6770,13 +6817,15 @@
               </a:ext>
             </a:extLst>
           </p:cNvPr>
-          <p:cNvCxnSpPr/>
+          <p:cNvCxnSpPr>
+            <a:cxnSpLocks/>
+          </p:cNvCxnSpPr>
           <p:nvPr/>
         </p:nvCxnSpPr>
         <p:spPr>
           <a:xfrm flipV="1">
-            <a:off x="4672668" y="3636629"/>
-            <a:ext cx="704675" cy="809536"/>
+            <a:off x="4672668" y="3127695"/>
+            <a:ext cx="659424" cy="1318470"/>
           </a:xfrm>
           <a:prstGeom prst="straightConnector1">
             <a:avLst/>
@@ -6879,13 +6928,15 @@
               </a:ext>
             </a:extLst>
           </p:cNvPr>
-          <p:cNvCxnSpPr/>
+          <p:cNvCxnSpPr>
+            <a:cxnSpLocks/>
+          </p:cNvCxnSpPr>
           <p:nvPr/>
         </p:nvCxnSpPr>
         <p:spPr>
           <a:xfrm flipH="1" flipV="1">
-            <a:off x="6342077" y="3795830"/>
-            <a:ext cx="1191237" cy="784365"/>
+            <a:off x="6207342" y="3357599"/>
+            <a:ext cx="1325973" cy="1222597"/>
           </a:xfrm>
           <a:prstGeom prst="straightConnector1">
             <a:avLst/>
@@ -6911,10 +6962,10 @@
       </p:cxnSp>
       <p:pic>
         <p:nvPicPr>
-          <p:cNvPr id="36" name="Picture 35">
+          <p:cNvPr id="14" name="Picture 13">
             <a:extLst>
               <a:ext uri="{FF2B5EF4-FFF2-40B4-BE49-F238E27FC236}">
-                <a16:creationId xmlns:a16="http://schemas.microsoft.com/office/drawing/2014/main" id="{4570FE17-7B6A-4A2C-ABF8-3C380739C52A}"/>
+                <a16:creationId xmlns:a16="http://schemas.microsoft.com/office/drawing/2014/main" id="{CCFC5279-34A9-4911-8ED1-3567EC680A5A}"/>
               </a:ext>
             </a:extLst>
           </p:cNvPr>
@@ -6931,8 +6982,8 @@
         </p:blipFill>
         <p:spPr>
           <a:xfrm>
-            <a:off x="8872446" y="314222"/>
-            <a:ext cx="2829320" cy="1667108"/>
+            <a:off x="9275054" y="167830"/>
+            <a:ext cx="2781688" cy="2476846"/>
           </a:xfrm>
           <a:prstGeom prst="rect">
             <a:avLst/>
@@ -7013,7 +7064,7 @@
         <p:spPr>
           <a:xfrm>
             <a:off x="1534160" y="1862667"/>
-            <a:ext cx="9184640" cy="1477328"/>
+            <a:ext cx="9184640" cy="3139321"/>
           </a:xfrm>
           <a:prstGeom prst="rect">
             <a:avLst/>
@@ -7028,20 +7079,37 @@
           <a:p>
             <a:r>
               <a:rPr lang="en-US" dirty="0"/>
-              <a:t>Awake() - </a:t>
-            </a:r>
-          </a:p>
-          <a:p>
-            <a:r>
-              <a:rPr lang="en-US" dirty="0"/>
-              <a:t>Start() -</a:t>
-            </a:r>
-          </a:p>
-          <a:p>
-            <a:r>
-              <a:rPr lang="en-US" dirty="0"/>
-              <a:t>Update() -</a:t>
-            </a:r>
+              <a:t>Awake() – The first function called on a </a:t>
+            </a:r>
+            <a:r>
+              <a:rPr lang="en-US" dirty="0" err="1"/>
+              <a:t>GameObject</a:t>
+            </a:r>
+            <a:r>
+              <a:rPr lang="en-US" dirty="0"/>
+              <a:t> when the game starts to play.</a:t>
+            </a:r>
+          </a:p>
+          <a:p>
+            <a:endParaRPr lang="en-US" dirty="0"/>
+          </a:p>
+          <a:p>
+            <a:r>
+              <a:rPr lang="en-US" dirty="0"/>
+              <a:t>Start() – This function is called immediately after Awake if they are both included.</a:t>
+            </a:r>
+          </a:p>
+          <a:p>
+            <a:endParaRPr lang="en-US" dirty="0"/>
+          </a:p>
+          <a:p>
+            <a:r>
+              <a:rPr lang="en-US" dirty="0"/>
+              <a:t>Update() – Gets called every frame, which can vary.</a:t>
+            </a:r>
+          </a:p>
+          <a:p>
+            <a:endParaRPr lang="en-US" dirty="0"/>
           </a:p>
           <a:p>
             <a:r>
@@ -7050,7 +7118,28 @@
             </a:r>
             <a:r>
               <a:rPr lang="en-US" dirty="0"/>
-              <a:t>() -</a:t>
+              <a:t>() – Gets called every fixed frame, which in Unity is every 0.02 seconds.</a:t>
+            </a:r>
+          </a:p>
+          <a:p>
+            <a:endParaRPr lang="en-US" dirty="0"/>
+          </a:p>
+          <a:p>
+            <a:r>
+              <a:rPr lang="en-US" dirty="0" err="1"/>
+              <a:t>GetComponent</a:t>
+            </a:r>
+            <a:r>
+              <a:rPr lang="en-US" dirty="0"/>
+              <a:t>()&lt;&gt; - Looks for a component on the </a:t>
+            </a:r>
+            <a:r>
+              <a:rPr lang="en-US" dirty="0" err="1"/>
+              <a:t>GameObject</a:t>
+            </a:r>
+            <a:r>
+              <a:rPr lang="en-US" dirty="0"/>
+              <a:t> our script is attached to, and if it is found will return that component for us to modify as we wish!</a:t>
             </a:r>
           </a:p>
           <a:p>
@@ -7131,8 +7220,8 @@
         </p:nvSpPr>
         <p:spPr>
           <a:xfrm>
-            <a:off x="1528354" y="1867989"/>
-            <a:ext cx="9405257" cy="1477328"/>
+            <a:off x="1411969" y="1951672"/>
+            <a:ext cx="9405257" cy="923330"/>
           </a:xfrm>
           <a:prstGeom prst="rect">
             <a:avLst/>
@@ -7152,26 +7241,18 @@
           </a:p>
           <a:p>
             <a:r>
-              <a:rPr lang="en-US" dirty="0"/>
-              <a:t>A class can be anything, including you!</a:t>
-            </a:r>
-          </a:p>
-          <a:p>
-            <a:r>
-              <a:rPr lang="en-US" dirty="0"/>
-              <a:t>Can contain a bunch of information about a ton of stuff</a:t>
-            </a:r>
-          </a:p>
-          <a:p>
-            <a:r>
-              <a:rPr lang="en-US" dirty="0"/>
-              <a:t>Made with the ‘class’ keyword</a:t>
-            </a:r>
-          </a:p>
-          <a:p>
-            <a:r>
-              <a:rPr lang="en-US" dirty="0"/>
-              <a:t>Usually contains variables, functions, and more!</a:t>
+              <a:rPr lang="en-US"/>
+              <a:t>A class can be anything, including you!Made with the ‘class’ keyword.</a:t>
+            </a:r>
+          </a:p>
+          <a:p>
+            <a:r>
+              <a:rPr lang="en-US"/>
+              <a:t>Usually </a:t>
+            </a:r>
+            <a:r>
+              <a:rPr lang="en-US" dirty="0"/>
+              <a:t>contains variables, functions, and more!</a:t>
             </a:r>
           </a:p>
         </p:txBody>
@@ -7241,6 +7322,413 @@
           <p:cNvPr id="2" name="Title 1">
             <a:extLst>
               <a:ext uri="{FF2B5EF4-FFF2-40B4-BE49-F238E27FC236}">
+                <a16:creationId xmlns:a16="http://schemas.microsoft.com/office/drawing/2014/main" id="{38C7D274-3A02-4E0C-83BC-A054FA0E50A7}"/>
+              </a:ext>
+            </a:extLst>
+          </p:cNvPr>
+          <p:cNvSpPr>
+            <a:spLocks noGrp="1"/>
+          </p:cNvSpPr>
+          <p:nvPr>
+            <p:ph type="title"/>
+          </p:nvPr>
+        </p:nvSpPr>
+        <p:spPr/>
+        <p:txBody>
+          <a:bodyPr/>
+          <a:lstStyle/>
+          <a:p>
+            <a:pPr algn="ctr"/>
+            <a:r>
+              <a:rPr lang="en-US" dirty="0"/>
+              <a:t>namespaces</a:t>
+            </a:r>
+          </a:p>
+        </p:txBody>
+      </p:sp>
+      <p:sp>
+        <p:nvSpPr>
+          <p:cNvPr id="4" name="TextBox 3">
+            <a:extLst>
+              <a:ext uri="{FF2B5EF4-FFF2-40B4-BE49-F238E27FC236}">
+                <a16:creationId xmlns:a16="http://schemas.microsoft.com/office/drawing/2014/main" id="{511DC747-FD9F-4566-AC71-1844585975DF}"/>
+              </a:ext>
+            </a:extLst>
+          </p:cNvPr>
+          <p:cNvSpPr txBox="1"/>
+          <p:nvPr/>
+        </p:nvSpPr>
+        <p:spPr>
+          <a:xfrm>
+            <a:off x="1082180" y="1929468"/>
+            <a:ext cx="9735046" cy="923330"/>
+          </a:xfrm>
+          <a:prstGeom prst="rect">
+            <a:avLst/>
+          </a:prstGeom>
+          <a:noFill/>
+        </p:spPr>
+        <p:txBody>
+          <a:bodyPr wrap="square" rtlCol="0">
+            <a:spAutoFit/>
+          </a:bodyPr>
+          <a:lstStyle/>
+          <a:p>
+            <a:pPr algn="ctr"/>
+            <a:r>
+              <a:rPr lang="en-US" dirty="0"/>
+              <a:t>Declared at the top of our files with the ‘using’ keyword.</a:t>
+            </a:r>
+          </a:p>
+          <a:p>
+            <a:pPr algn="ctr"/>
+            <a:r>
+              <a:rPr lang="en-US" dirty="0"/>
+              <a:t>Contains many useful classes, functions, and more!</a:t>
+            </a:r>
+          </a:p>
+          <a:p>
+            <a:pPr algn="ctr"/>
+            <a:endParaRPr lang="en-US" dirty="0"/>
+          </a:p>
+        </p:txBody>
+      </p:sp>
+      <p:pic>
+        <p:nvPicPr>
+          <p:cNvPr id="6" name="Picture 5">
+            <a:extLst>
+              <a:ext uri="{FF2B5EF4-FFF2-40B4-BE49-F238E27FC236}">
+                <a16:creationId xmlns:a16="http://schemas.microsoft.com/office/drawing/2014/main" id="{E4B18245-9A30-4394-9333-163D87A46E51}"/>
+              </a:ext>
+            </a:extLst>
+          </p:cNvPr>
+          <p:cNvPicPr>
+            <a:picLocks noChangeAspect="1"/>
+          </p:cNvPicPr>
+          <p:nvPr/>
+        </p:nvPicPr>
+        <p:blipFill>
+          <a:blip r:embed="rId2"/>
+          <a:stretch>
+            <a:fillRect/>
+          </a:stretch>
+        </p:blipFill>
+        <p:spPr>
+          <a:xfrm>
+            <a:off x="7798973" y="376667"/>
+            <a:ext cx="3867690" cy="1076475"/>
+          </a:xfrm>
+          <a:prstGeom prst="rect">
+            <a:avLst/>
+          </a:prstGeom>
+        </p:spPr>
+      </p:pic>
+      <p:sp>
+        <p:nvSpPr>
+          <p:cNvPr id="7" name="TextBox 6">
+            <a:extLst>
+              <a:ext uri="{FF2B5EF4-FFF2-40B4-BE49-F238E27FC236}">
+                <a16:creationId xmlns:a16="http://schemas.microsoft.com/office/drawing/2014/main" id="{2292E693-8800-45F9-8FB9-2E554A5854D1}"/>
+              </a:ext>
+            </a:extLst>
+          </p:cNvPr>
+          <p:cNvSpPr txBox="1"/>
+          <p:nvPr/>
+        </p:nvSpPr>
+        <p:spPr>
+          <a:xfrm>
+            <a:off x="4580200" y="2919370"/>
+            <a:ext cx="2342625" cy="369332"/>
+          </a:xfrm>
+          <a:prstGeom prst="rect">
+            <a:avLst/>
+          </a:prstGeom>
+          <a:noFill/>
+        </p:spPr>
+        <p:txBody>
+          <a:bodyPr wrap="square" rtlCol="0">
+            <a:spAutoFit/>
+          </a:bodyPr>
+          <a:lstStyle/>
+          <a:p>
+            <a:r>
+              <a:rPr lang="en-US" dirty="0"/>
+              <a:t>using </a:t>
+            </a:r>
+            <a:r>
+              <a:rPr lang="en-US" dirty="0" err="1"/>
+              <a:t>UnityEngine</a:t>
+            </a:r>
+            <a:r>
+              <a:rPr lang="en-US" dirty="0"/>
+              <a:t>; </a:t>
+            </a:r>
+          </a:p>
+        </p:txBody>
+      </p:sp>
+      <p:cxnSp>
+        <p:nvCxnSpPr>
+          <p:cNvPr id="9" name="Straight Arrow Connector 8">
+            <a:extLst>
+              <a:ext uri="{FF2B5EF4-FFF2-40B4-BE49-F238E27FC236}">
+                <a16:creationId xmlns:a16="http://schemas.microsoft.com/office/drawing/2014/main" id="{5B07281F-6A91-4A46-B092-C31292CA3BD4}"/>
+              </a:ext>
+            </a:extLst>
+          </p:cNvPr>
+          <p:cNvCxnSpPr>
+            <a:cxnSpLocks/>
+          </p:cNvCxnSpPr>
+          <p:nvPr/>
+        </p:nvCxnSpPr>
+        <p:spPr>
+          <a:xfrm flipV="1">
+            <a:off x="3431097" y="3221372"/>
+            <a:ext cx="1249960" cy="486562"/>
+          </a:xfrm>
+          <a:prstGeom prst="straightConnector1">
+            <a:avLst/>
+          </a:prstGeom>
+          <a:ln>
+            <a:tailEnd type="triangle"/>
+          </a:ln>
+        </p:spPr>
+        <p:style>
+          <a:lnRef idx="1">
+            <a:schemeClr val="accent1"/>
+          </a:lnRef>
+          <a:fillRef idx="0">
+            <a:schemeClr val="accent1"/>
+          </a:fillRef>
+          <a:effectRef idx="0">
+            <a:schemeClr val="accent1"/>
+          </a:effectRef>
+          <a:fontRef idx="minor">
+            <a:schemeClr val="tx1"/>
+          </a:fontRef>
+        </p:style>
+      </p:cxnSp>
+      <p:sp>
+        <p:nvSpPr>
+          <p:cNvPr id="11" name="TextBox 10">
+            <a:extLst>
+              <a:ext uri="{FF2B5EF4-FFF2-40B4-BE49-F238E27FC236}">
+                <a16:creationId xmlns:a16="http://schemas.microsoft.com/office/drawing/2014/main" id="{96315D01-46CE-4D30-88A3-05249E0DF471}"/>
+              </a:ext>
+            </a:extLst>
+          </p:cNvPr>
+          <p:cNvSpPr txBox="1"/>
+          <p:nvPr/>
+        </p:nvSpPr>
+        <p:spPr>
+          <a:xfrm>
+            <a:off x="631782" y="3666206"/>
+            <a:ext cx="3948418" cy="369332"/>
+          </a:xfrm>
+          <a:prstGeom prst="rect">
+            <a:avLst/>
+          </a:prstGeom>
+          <a:noFill/>
+        </p:spPr>
+        <p:txBody>
+          <a:bodyPr wrap="square" rtlCol="0">
+            <a:spAutoFit/>
+          </a:bodyPr>
+          <a:lstStyle/>
+          <a:p>
+            <a:r>
+              <a:rPr lang="en-US" dirty="0"/>
+              <a:t>Always starts with the ‘using’ keyword.</a:t>
+            </a:r>
+          </a:p>
+        </p:txBody>
+      </p:sp>
+      <p:cxnSp>
+        <p:nvCxnSpPr>
+          <p:cNvPr id="13" name="Straight Arrow Connector 12">
+            <a:extLst>
+              <a:ext uri="{FF2B5EF4-FFF2-40B4-BE49-F238E27FC236}">
+                <a16:creationId xmlns:a16="http://schemas.microsoft.com/office/drawing/2014/main" id="{2C0653EE-166F-4F7F-AD34-167F34705015}"/>
+              </a:ext>
+            </a:extLst>
+          </p:cNvPr>
+          <p:cNvCxnSpPr>
+            <a:cxnSpLocks/>
+          </p:cNvCxnSpPr>
+          <p:nvPr/>
+        </p:nvCxnSpPr>
+        <p:spPr>
+          <a:xfrm flipH="1" flipV="1">
+            <a:off x="5949704" y="3288702"/>
+            <a:ext cx="146296" cy="620570"/>
+          </a:xfrm>
+          <a:prstGeom prst="straightConnector1">
+            <a:avLst/>
+          </a:prstGeom>
+          <a:ln>
+            <a:tailEnd type="triangle"/>
+          </a:ln>
+        </p:spPr>
+        <p:style>
+          <a:lnRef idx="1">
+            <a:schemeClr val="accent1"/>
+          </a:lnRef>
+          <a:fillRef idx="0">
+            <a:schemeClr val="accent1"/>
+          </a:fillRef>
+          <a:effectRef idx="0">
+            <a:schemeClr val="accent1"/>
+          </a:effectRef>
+          <a:fontRef idx="minor">
+            <a:schemeClr val="tx1"/>
+          </a:fontRef>
+        </p:style>
+      </p:cxnSp>
+      <p:sp>
+        <p:nvSpPr>
+          <p:cNvPr id="15" name="TextBox 14">
+            <a:extLst>
+              <a:ext uri="{FF2B5EF4-FFF2-40B4-BE49-F238E27FC236}">
+                <a16:creationId xmlns:a16="http://schemas.microsoft.com/office/drawing/2014/main" id="{6014F57B-8617-4CB3-B459-1673838447BD}"/>
+              </a:ext>
+            </a:extLst>
+          </p:cNvPr>
+          <p:cNvSpPr txBox="1"/>
+          <p:nvPr/>
+        </p:nvSpPr>
+        <p:spPr>
+          <a:xfrm>
+            <a:off x="5426600" y="3909272"/>
+            <a:ext cx="2584886" cy="646331"/>
+          </a:xfrm>
+          <a:prstGeom prst="rect">
+            <a:avLst/>
+          </a:prstGeom>
+          <a:noFill/>
+        </p:spPr>
+        <p:txBody>
+          <a:bodyPr wrap="square" rtlCol="0">
+            <a:spAutoFit/>
+          </a:bodyPr>
+          <a:lstStyle/>
+          <a:p>
+            <a:r>
+              <a:rPr lang="en-US" dirty="0"/>
+              <a:t>The name of the namespace we are using.</a:t>
+            </a:r>
+          </a:p>
+        </p:txBody>
+      </p:sp>
+      <p:cxnSp>
+        <p:nvCxnSpPr>
+          <p:cNvPr id="17" name="Straight Arrow Connector 16">
+            <a:extLst>
+              <a:ext uri="{FF2B5EF4-FFF2-40B4-BE49-F238E27FC236}">
+                <a16:creationId xmlns:a16="http://schemas.microsoft.com/office/drawing/2014/main" id="{4F4B13EB-538B-4AD3-A466-0424FE1EA3A2}"/>
+              </a:ext>
+            </a:extLst>
+          </p:cNvPr>
+          <p:cNvCxnSpPr>
+            <a:cxnSpLocks/>
+          </p:cNvCxnSpPr>
+          <p:nvPr/>
+        </p:nvCxnSpPr>
+        <p:spPr>
+          <a:xfrm flipH="1" flipV="1">
+            <a:off x="6451135" y="3104037"/>
+            <a:ext cx="1904300" cy="213972"/>
+          </a:xfrm>
+          <a:prstGeom prst="straightConnector1">
+            <a:avLst/>
+          </a:prstGeom>
+          <a:ln>
+            <a:tailEnd type="triangle"/>
+          </a:ln>
+        </p:spPr>
+        <p:style>
+          <a:lnRef idx="1">
+            <a:schemeClr val="accent1"/>
+          </a:lnRef>
+          <a:fillRef idx="0">
+            <a:schemeClr val="accent1"/>
+          </a:fillRef>
+          <a:effectRef idx="0">
+            <a:schemeClr val="accent1"/>
+          </a:effectRef>
+          <a:fontRef idx="minor">
+            <a:schemeClr val="tx1"/>
+          </a:fontRef>
+        </p:style>
+      </p:cxnSp>
+      <p:sp>
+        <p:nvSpPr>
+          <p:cNvPr id="19" name="TextBox 18">
+            <a:extLst>
+              <a:ext uri="{FF2B5EF4-FFF2-40B4-BE49-F238E27FC236}">
+                <a16:creationId xmlns:a16="http://schemas.microsoft.com/office/drawing/2014/main" id="{62464AAC-C1EA-409A-8B06-BA95C45CE96B}"/>
+              </a:ext>
+            </a:extLst>
+          </p:cNvPr>
+          <p:cNvSpPr txBox="1"/>
+          <p:nvPr/>
+        </p:nvSpPr>
+        <p:spPr>
+          <a:xfrm>
+            <a:off x="8325884" y="3213092"/>
+            <a:ext cx="2407640" cy="369332"/>
+          </a:xfrm>
+          <a:prstGeom prst="rect">
+            <a:avLst/>
+          </a:prstGeom>
+          <a:noFill/>
+        </p:spPr>
+        <p:txBody>
+          <a:bodyPr wrap="square" rtlCol="0">
+            <a:spAutoFit/>
+          </a:bodyPr>
+          <a:lstStyle/>
+          <a:p>
+            <a:r>
+              <a:rPr lang="en-US" dirty="0"/>
+              <a:t>Ends with a semicolon.</a:t>
+            </a:r>
+          </a:p>
+        </p:txBody>
+      </p:sp>
+    </p:spTree>
+    <p:extLst>
+      <p:ext uri="{BB962C8B-B14F-4D97-AF65-F5344CB8AC3E}">
+        <p14:creationId xmlns:p14="http://schemas.microsoft.com/office/powerpoint/2010/main" val="936163557"/>
+      </p:ext>
+    </p:extLst>
+  </p:cSld>
+  <p:clrMapOvr>
+    <a:masterClrMapping/>
+  </p:clrMapOvr>
+</p:sld>
+</file>
+
+<file path=ppt/slides/slide7.xml><?xml version="1.0" encoding="utf-8"?>
+<p:sld xmlns:a="http://schemas.openxmlformats.org/drawingml/2006/main" xmlns:r="http://schemas.openxmlformats.org/officeDocument/2006/relationships" xmlns:p="http://schemas.openxmlformats.org/presentationml/2006/main">
+  <p:cSld>
+    <p:spTree>
+      <p:nvGrpSpPr>
+        <p:cNvPr id="1" name=""/>
+        <p:cNvGrpSpPr/>
+        <p:nvPr/>
+      </p:nvGrpSpPr>
+      <p:grpSpPr>
+        <a:xfrm>
+          <a:off x="0" y="0"/>
+          <a:ext cx="0" cy="0"/>
+          <a:chOff x="0" y="0"/>
+          <a:chExt cx="0" cy="0"/>
+        </a:xfrm>
+      </p:grpSpPr>
+      <p:sp>
+        <p:nvSpPr>
+          <p:cNvPr id="2" name="Title 1">
+            <a:extLst>
+              <a:ext uri="{FF2B5EF4-FFF2-40B4-BE49-F238E27FC236}">
                 <a16:creationId xmlns:a16="http://schemas.microsoft.com/office/drawing/2014/main" id="{A241EEEE-C90F-44DF-812F-6C45FCABC75A}"/>
               </a:ext>
             </a:extLst>
@@ -7260,33 +7748,99 @@
             <a:pPr algn="ctr"/>
             <a:r>
               <a:rPr lang="en-US" dirty="0"/>
-              <a:t>Using functions within a class</a:t>
-            </a:r>
-          </a:p>
-        </p:txBody>
-      </p:sp>
-      <p:sp>
-        <p:nvSpPr>
-          <p:cNvPr id="3" name="Content Placeholder 2">
+              <a:t>Accessing members of a class</a:t>
+            </a:r>
+          </a:p>
+        </p:txBody>
+      </p:sp>
+      <p:sp>
+        <p:nvSpPr>
+          <p:cNvPr id="4" name="TextBox 3">
             <a:extLst>
               <a:ext uri="{FF2B5EF4-FFF2-40B4-BE49-F238E27FC236}">
-                <a16:creationId xmlns:a16="http://schemas.microsoft.com/office/drawing/2014/main" id="{0236EF9E-1080-48FA-BDD1-CCEF0EB42CDA}"/>
+                <a16:creationId xmlns:a16="http://schemas.microsoft.com/office/drawing/2014/main" id="{72EDB76B-0B15-46BA-8143-5EE49142E743}"/>
               </a:ext>
             </a:extLst>
           </p:cNvPr>
-          <p:cNvSpPr>
-            <a:spLocks noGrp="1"/>
-          </p:cNvSpPr>
-          <p:nvPr>
-            <p:ph idx="1"/>
-          </p:nvPr>
-        </p:nvSpPr>
-        <p:spPr/>
-        <p:txBody>
-          <a:bodyPr/>
-          <a:lstStyle/>
-          <a:p>
-            <a:endParaRPr lang="en-US"/>
+          <p:cNvSpPr txBox="1"/>
+          <p:nvPr/>
+        </p:nvSpPr>
+        <p:spPr>
+          <a:xfrm>
+            <a:off x="620785" y="1879134"/>
+            <a:ext cx="10196441" cy="2308324"/>
+          </a:xfrm>
+          <a:prstGeom prst="rect">
+            <a:avLst/>
+          </a:prstGeom>
+          <a:noFill/>
+        </p:spPr>
+        <p:txBody>
+          <a:bodyPr wrap="square" rtlCol="0">
+            <a:spAutoFit/>
+          </a:bodyPr>
+          <a:lstStyle/>
+          <a:p>
+            <a:pPr algn="ctr"/>
+            <a:r>
+              <a:rPr lang="en-US" dirty="0"/>
+              <a:t>How do we get functions and variables inside a class from a different class?</a:t>
+            </a:r>
+          </a:p>
+          <a:p>
+            <a:pPr algn="ctr"/>
+            <a:r>
+              <a:rPr lang="en-US" dirty="0"/>
+              <a:t>THE DOT OPERATOR (.)</a:t>
+            </a:r>
+          </a:p>
+          <a:p>
+            <a:pPr algn="ctr"/>
+            <a:endParaRPr lang="en-US" dirty="0"/>
+          </a:p>
+          <a:p>
+            <a:pPr algn="ctr"/>
+            <a:r>
+              <a:rPr lang="en-US" dirty="0"/>
+              <a:t>The System namespace in C# comes with some useful functions for us to use already with any variable:</a:t>
+            </a:r>
+          </a:p>
+          <a:p>
+            <a:pPr algn="ctr"/>
+            <a:r>
+              <a:rPr lang="en-US" dirty="0" err="1"/>
+              <a:t>ToString</a:t>
+            </a:r>
+            <a:r>
+              <a:rPr lang="en-US" dirty="0"/>
+              <a:t>()</a:t>
+            </a:r>
+          </a:p>
+          <a:p>
+            <a:pPr algn="ctr"/>
+            <a:r>
+              <a:rPr lang="en-US" dirty="0" err="1"/>
+              <a:t>CompareTo</a:t>
+            </a:r>
+            <a:r>
+              <a:rPr lang="en-US" dirty="0"/>
+              <a:t>()</a:t>
+            </a:r>
+          </a:p>
+          <a:p>
+            <a:pPr algn="ctr"/>
+            <a:r>
+              <a:rPr lang="en-US" dirty="0" err="1"/>
+              <a:t>GetType</a:t>
+            </a:r>
+            <a:r>
+              <a:rPr lang="en-US" dirty="0"/>
+              <a:t>()</a:t>
+            </a:r>
+          </a:p>
+          <a:p>
+            <a:pPr algn="ctr"/>
+            <a:endParaRPr lang="en-US" dirty="0"/>
           </a:p>
         </p:txBody>
       </p:sp>
@@ -7303,7 +7857,7 @@
 </p:sld>
 </file>
 
-<file path=ppt/slides/slide7.xml><?xml version="1.0" encoding="utf-8"?>
+<file path=ppt/slides/slide8.xml><?xml version="1.0" encoding="utf-8"?>
 <p:sld xmlns:a="http://schemas.openxmlformats.org/drawingml/2006/main" xmlns:r="http://schemas.openxmlformats.org/officeDocument/2006/relationships" xmlns:p="http://schemas.openxmlformats.org/presentationml/2006/main">
   <p:cSld>
     <p:spTree>

</xml_diff>